<commit_message>
add from zero learning the retrieval system
</commit_message>
<xml_diff>
--- a/搜索推荐广告/检索系统/信息检索系统前言/素材.pptx
+++ b/搜索推荐广告/检索系统/信息检索系统前言/素材.pptx
@@ -264,7 +264,7 @@
           <a:p>
             <a:fld id="{64CCC79A-9F7C-4306-A709-BF5D57071B81}" type="datetimeFigureOut">
               <a:rPr lang="zh-CN" altLang="en-US" smtClean="0"/>
-              <a:t>2021/3/28 Sunday</a:t>
+              <a:t>2021/5/3 Monday</a:t>
             </a:fld>
             <a:endParaRPr lang="zh-CN" altLang="en-US"/>
           </a:p>
@@ -462,7 +462,7 @@
           <a:p>
             <a:fld id="{64CCC79A-9F7C-4306-A709-BF5D57071B81}" type="datetimeFigureOut">
               <a:rPr lang="zh-CN" altLang="en-US" smtClean="0"/>
-              <a:t>2021/3/28 Sunday</a:t>
+              <a:t>2021/5/3 Monday</a:t>
             </a:fld>
             <a:endParaRPr lang="zh-CN" altLang="en-US"/>
           </a:p>
@@ -670,7 +670,7 @@
           <a:p>
             <a:fld id="{64CCC79A-9F7C-4306-A709-BF5D57071B81}" type="datetimeFigureOut">
               <a:rPr lang="zh-CN" altLang="en-US" smtClean="0"/>
-              <a:t>2021/3/28 Sunday</a:t>
+              <a:t>2021/5/3 Monday</a:t>
             </a:fld>
             <a:endParaRPr lang="zh-CN" altLang="en-US"/>
           </a:p>
@@ -868,7 +868,7 @@
           <a:p>
             <a:fld id="{64CCC79A-9F7C-4306-A709-BF5D57071B81}" type="datetimeFigureOut">
               <a:rPr lang="zh-CN" altLang="en-US" smtClean="0"/>
-              <a:t>2021/3/28 Sunday</a:t>
+              <a:t>2021/5/3 Monday</a:t>
             </a:fld>
             <a:endParaRPr lang="zh-CN" altLang="en-US"/>
           </a:p>
@@ -1143,7 +1143,7 @@
           <a:p>
             <a:fld id="{64CCC79A-9F7C-4306-A709-BF5D57071B81}" type="datetimeFigureOut">
               <a:rPr lang="zh-CN" altLang="en-US" smtClean="0"/>
-              <a:t>2021/3/28 Sunday</a:t>
+              <a:t>2021/5/3 Monday</a:t>
             </a:fld>
             <a:endParaRPr lang="zh-CN" altLang="en-US"/>
           </a:p>
@@ -1408,7 +1408,7 @@
           <a:p>
             <a:fld id="{64CCC79A-9F7C-4306-A709-BF5D57071B81}" type="datetimeFigureOut">
               <a:rPr lang="zh-CN" altLang="en-US" smtClean="0"/>
-              <a:t>2021/3/28 Sunday</a:t>
+              <a:t>2021/5/3 Monday</a:t>
             </a:fld>
             <a:endParaRPr lang="zh-CN" altLang="en-US"/>
           </a:p>
@@ -1820,7 +1820,7 @@
           <a:p>
             <a:fld id="{64CCC79A-9F7C-4306-A709-BF5D57071B81}" type="datetimeFigureOut">
               <a:rPr lang="zh-CN" altLang="en-US" smtClean="0"/>
-              <a:t>2021/3/28 Sunday</a:t>
+              <a:t>2021/5/3 Monday</a:t>
             </a:fld>
             <a:endParaRPr lang="zh-CN" altLang="en-US"/>
           </a:p>
@@ -1961,7 +1961,7 @@
           <a:p>
             <a:fld id="{64CCC79A-9F7C-4306-A709-BF5D57071B81}" type="datetimeFigureOut">
               <a:rPr lang="zh-CN" altLang="en-US" smtClean="0"/>
-              <a:t>2021/3/28 Sunday</a:t>
+              <a:t>2021/5/3 Monday</a:t>
             </a:fld>
             <a:endParaRPr lang="zh-CN" altLang="en-US"/>
           </a:p>
@@ -2074,7 +2074,7 @@
           <a:p>
             <a:fld id="{64CCC79A-9F7C-4306-A709-BF5D57071B81}" type="datetimeFigureOut">
               <a:rPr lang="zh-CN" altLang="en-US" smtClean="0"/>
-              <a:t>2021/3/28 Sunday</a:t>
+              <a:t>2021/5/3 Monday</a:t>
             </a:fld>
             <a:endParaRPr lang="zh-CN" altLang="en-US"/>
           </a:p>
@@ -2385,7 +2385,7 @@
           <a:p>
             <a:fld id="{64CCC79A-9F7C-4306-A709-BF5D57071B81}" type="datetimeFigureOut">
               <a:rPr lang="zh-CN" altLang="en-US" smtClean="0"/>
-              <a:t>2021/3/28 Sunday</a:t>
+              <a:t>2021/5/3 Monday</a:t>
             </a:fld>
             <a:endParaRPr lang="zh-CN" altLang="en-US"/>
           </a:p>
@@ -2673,7 +2673,7 @@
           <a:p>
             <a:fld id="{64CCC79A-9F7C-4306-A709-BF5D57071B81}" type="datetimeFigureOut">
               <a:rPr lang="zh-CN" altLang="en-US" smtClean="0"/>
-              <a:t>2021/3/28 Sunday</a:t>
+              <a:t>2021/5/3 Monday</a:t>
             </a:fld>
             <a:endParaRPr lang="zh-CN" altLang="en-US"/>
           </a:p>
@@ -2914,7 +2914,7 @@
           <a:p>
             <a:fld id="{64CCC79A-9F7C-4306-A709-BF5D57071B81}" type="datetimeFigureOut">
               <a:rPr lang="zh-CN" altLang="en-US" smtClean="0"/>
-              <a:t>2021/3/28 Sunday</a:t>
+              <a:t>2021/5/3 Monday</a:t>
             </a:fld>
             <a:endParaRPr lang="zh-CN" altLang="en-US"/>
           </a:p>
@@ -6246,6 +6246,869 @@
           <a:chExt cx="0" cy="0"/>
         </a:xfrm>
       </p:grpSpPr>
+      <p:grpSp>
+        <p:nvGrpSpPr>
+          <p:cNvPr id="24" name="组合 23">
+            <a:extLst>
+              <a:ext uri="{FF2B5EF4-FFF2-40B4-BE49-F238E27FC236}">
+                <a16:creationId xmlns:a16="http://schemas.microsoft.com/office/drawing/2014/main" id="{EF84E766-82A0-447A-ABB5-68AC32CD5BC4}"/>
+              </a:ext>
+            </a:extLst>
+          </p:cNvPr>
+          <p:cNvGrpSpPr/>
+          <p:nvPr/>
+        </p:nvGrpSpPr>
+        <p:grpSpPr>
+          <a:xfrm>
+            <a:off x="2641600" y="382535"/>
+            <a:ext cx="5392447" cy="6661936"/>
+            <a:chOff x="2641600" y="382535"/>
+            <a:chExt cx="5392447" cy="6661936"/>
+          </a:xfrm>
+        </p:grpSpPr>
+        <p:sp>
+          <p:nvSpPr>
+            <p:cNvPr id="2" name="矩形 1">
+              <a:extLst>
+                <a:ext uri="{FF2B5EF4-FFF2-40B4-BE49-F238E27FC236}">
+                  <a16:creationId xmlns:a16="http://schemas.microsoft.com/office/drawing/2014/main" id="{E474BC41-AB62-436A-8311-324110DB76FF}"/>
+                </a:ext>
+              </a:extLst>
+            </p:cNvPr>
+            <p:cNvSpPr/>
+            <p:nvPr/>
+          </p:nvSpPr>
+          <p:spPr>
+            <a:xfrm>
+              <a:off x="2641600" y="1636889"/>
+              <a:ext cx="530578" cy="2668893"/>
+            </a:xfrm>
+            <a:prstGeom prst="rect">
+              <a:avLst/>
+            </a:prstGeom>
+            <a:solidFill>
+              <a:schemeClr val="accent6">
+                <a:lumMod val="75000"/>
+                <a:alpha val="60000"/>
+              </a:schemeClr>
+            </a:solidFill>
+            <a:ln>
+              <a:noFill/>
+            </a:ln>
+          </p:spPr>
+          <p:style>
+            <a:lnRef idx="2">
+              <a:schemeClr val="accent1">
+                <a:shade val="50000"/>
+              </a:schemeClr>
+            </a:lnRef>
+            <a:fillRef idx="1">
+              <a:schemeClr val="accent1"/>
+            </a:fillRef>
+            <a:effectRef idx="0">
+              <a:schemeClr val="accent1"/>
+            </a:effectRef>
+            <a:fontRef idx="minor">
+              <a:schemeClr val="lt1"/>
+            </a:fontRef>
+          </p:style>
+          <p:txBody>
+            <a:bodyPr rtlCol="0" anchor="ctr"/>
+            <a:lstStyle/>
+            <a:p>
+              <a:pPr algn="ctr"/>
+              <a:endParaRPr lang="zh-CN" altLang="en-US" dirty="0"/>
+            </a:p>
+          </p:txBody>
+        </p:sp>
+        <p:sp>
+          <p:nvSpPr>
+            <p:cNvPr id="5" name="矩形 4">
+              <a:extLst>
+                <a:ext uri="{FF2B5EF4-FFF2-40B4-BE49-F238E27FC236}">
+                  <a16:creationId xmlns:a16="http://schemas.microsoft.com/office/drawing/2014/main" id="{C09E86E7-62B1-44DA-94F1-13B26D032C91}"/>
+                </a:ext>
+              </a:extLst>
+            </p:cNvPr>
+            <p:cNvSpPr/>
+            <p:nvPr/>
+          </p:nvSpPr>
+          <p:spPr>
+            <a:xfrm>
+              <a:off x="3627377" y="1636889"/>
+              <a:ext cx="530578" cy="2668893"/>
+            </a:xfrm>
+            <a:prstGeom prst="rect">
+              <a:avLst/>
+            </a:prstGeom>
+            <a:solidFill>
+              <a:schemeClr val="accent6">
+                <a:lumMod val="75000"/>
+                <a:alpha val="60000"/>
+              </a:schemeClr>
+            </a:solidFill>
+            <a:ln>
+              <a:noFill/>
+            </a:ln>
+          </p:spPr>
+          <p:style>
+            <a:lnRef idx="2">
+              <a:schemeClr val="accent1">
+                <a:shade val="50000"/>
+              </a:schemeClr>
+            </a:lnRef>
+            <a:fillRef idx="1">
+              <a:schemeClr val="accent1"/>
+            </a:fillRef>
+            <a:effectRef idx="0">
+              <a:schemeClr val="accent1"/>
+            </a:effectRef>
+            <a:fontRef idx="minor">
+              <a:schemeClr val="lt1"/>
+            </a:fontRef>
+          </p:style>
+          <p:txBody>
+            <a:bodyPr rtlCol="0" anchor="ctr"/>
+            <a:lstStyle/>
+            <a:p>
+              <a:pPr algn="ctr"/>
+              <a:endParaRPr lang="zh-CN" altLang="en-US"/>
+            </a:p>
+          </p:txBody>
+        </p:sp>
+        <p:sp>
+          <p:nvSpPr>
+            <p:cNvPr id="6" name="矩形 5">
+              <a:extLst>
+                <a:ext uri="{FF2B5EF4-FFF2-40B4-BE49-F238E27FC236}">
+                  <a16:creationId xmlns:a16="http://schemas.microsoft.com/office/drawing/2014/main" id="{2957D3D4-D759-4C77-BC24-C97F0B24DB61}"/>
+                </a:ext>
+              </a:extLst>
+            </p:cNvPr>
+            <p:cNvSpPr/>
+            <p:nvPr/>
+          </p:nvSpPr>
+          <p:spPr>
+            <a:xfrm>
+              <a:off x="5393733" y="1636889"/>
+              <a:ext cx="530578" cy="2668893"/>
+            </a:xfrm>
+            <a:prstGeom prst="rect">
+              <a:avLst/>
+            </a:prstGeom>
+            <a:solidFill>
+              <a:schemeClr val="accent6">
+                <a:lumMod val="75000"/>
+                <a:alpha val="60000"/>
+              </a:schemeClr>
+            </a:solidFill>
+            <a:ln>
+              <a:noFill/>
+            </a:ln>
+          </p:spPr>
+          <p:style>
+            <a:lnRef idx="2">
+              <a:schemeClr val="accent1">
+                <a:shade val="50000"/>
+              </a:schemeClr>
+            </a:lnRef>
+            <a:fillRef idx="1">
+              <a:schemeClr val="accent1"/>
+            </a:fillRef>
+            <a:effectRef idx="0">
+              <a:schemeClr val="accent1"/>
+            </a:effectRef>
+            <a:fontRef idx="minor">
+              <a:schemeClr val="lt1"/>
+            </a:fontRef>
+          </p:style>
+          <p:txBody>
+            <a:bodyPr rtlCol="0" anchor="ctr"/>
+            <a:lstStyle/>
+            <a:p>
+              <a:pPr algn="ctr"/>
+              <a:endParaRPr lang="zh-CN" altLang="en-US"/>
+            </a:p>
+          </p:txBody>
+        </p:sp>
+        <p:sp>
+          <p:nvSpPr>
+            <p:cNvPr id="7" name="文本框 6">
+              <a:extLst>
+                <a:ext uri="{FF2B5EF4-FFF2-40B4-BE49-F238E27FC236}">
+                  <a16:creationId xmlns:a16="http://schemas.microsoft.com/office/drawing/2014/main" id="{72273D91-5CFE-4F71-8758-BE103A3FA222}"/>
+                </a:ext>
+              </a:extLst>
+            </p:cNvPr>
+            <p:cNvSpPr txBox="1"/>
+            <p:nvPr/>
+          </p:nvSpPr>
+          <p:spPr>
+            <a:xfrm>
+              <a:off x="4297034" y="2844225"/>
+              <a:ext cx="1055868" cy="584775"/>
+            </a:xfrm>
+            <a:prstGeom prst="rect">
+              <a:avLst/>
+            </a:prstGeom>
+            <a:noFill/>
+          </p:spPr>
+          <p:txBody>
+            <a:bodyPr wrap="square" rtlCol="0">
+              <a:spAutoFit/>
+            </a:bodyPr>
+            <a:lstStyle/>
+            <a:p>
+              <a:r>
+                <a:rPr lang="en-US" altLang="zh-CN" sz="3200" b="1" dirty="0"/>
+                <a:t>……</a:t>
+              </a:r>
+              <a:endParaRPr lang="zh-CN" altLang="en-US" sz="3200" b="1" dirty="0"/>
+            </a:p>
+          </p:txBody>
+        </p:sp>
+        <p:sp>
+          <p:nvSpPr>
+            <p:cNvPr id="8" name="箭头: 右 7">
+              <a:extLst>
+                <a:ext uri="{FF2B5EF4-FFF2-40B4-BE49-F238E27FC236}">
+                  <a16:creationId xmlns:a16="http://schemas.microsoft.com/office/drawing/2014/main" id="{15BCE407-4DEF-4843-A71C-4527ED82C66B}"/>
+                </a:ext>
+              </a:extLst>
+            </p:cNvPr>
+            <p:cNvSpPr/>
+            <p:nvPr/>
+          </p:nvSpPr>
+          <p:spPr>
+            <a:xfrm rot="5400000">
+              <a:off x="4182955" y="729672"/>
+              <a:ext cx="400561" cy="1024664"/>
+            </a:xfrm>
+            <a:prstGeom prst="rightArrow">
+              <a:avLst/>
+            </a:prstGeom>
+            <a:gradFill flip="none" rotWithShape="1">
+              <a:gsLst>
+                <a:gs pos="0">
+                  <a:schemeClr val="accent4">
+                    <a:lumMod val="40000"/>
+                    <a:lumOff val="60000"/>
+                  </a:schemeClr>
+                </a:gs>
+                <a:gs pos="46000">
+                  <a:schemeClr val="accent4">
+                    <a:lumMod val="95000"/>
+                    <a:lumOff val="5000"/>
+                  </a:schemeClr>
+                </a:gs>
+                <a:gs pos="84000">
+                  <a:schemeClr val="accent4">
+                    <a:lumMod val="60000"/>
+                  </a:schemeClr>
+                </a:gs>
+              </a:gsLst>
+              <a:lin ang="10800000" scaled="0"/>
+              <a:tileRect/>
+            </a:gradFill>
+            <a:ln>
+              <a:noFill/>
+            </a:ln>
+          </p:spPr>
+          <p:style>
+            <a:lnRef idx="2">
+              <a:schemeClr val="accent1">
+                <a:shade val="50000"/>
+              </a:schemeClr>
+            </a:lnRef>
+            <a:fillRef idx="1">
+              <a:schemeClr val="accent1"/>
+            </a:fillRef>
+            <a:effectRef idx="0">
+              <a:schemeClr val="accent1"/>
+            </a:effectRef>
+            <a:fontRef idx="minor">
+              <a:schemeClr val="lt1"/>
+            </a:fontRef>
+          </p:style>
+          <p:txBody>
+            <a:bodyPr rtlCol="0" anchor="ctr"/>
+            <a:lstStyle/>
+            <a:p>
+              <a:pPr algn="ctr"/>
+              <a:endParaRPr lang="zh-CN" altLang="en-US"/>
+            </a:p>
+          </p:txBody>
+        </p:sp>
+        <p:sp>
+          <p:nvSpPr>
+            <p:cNvPr id="9" name="文本框 8">
+              <a:extLst>
+                <a:ext uri="{FF2B5EF4-FFF2-40B4-BE49-F238E27FC236}">
+                  <a16:creationId xmlns:a16="http://schemas.microsoft.com/office/drawing/2014/main" id="{40BAD1C0-E9C5-4134-8CDD-1CAD9C45B63B}"/>
+                </a:ext>
+              </a:extLst>
+            </p:cNvPr>
+            <p:cNvSpPr txBox="1"/>
+            <p:nvPr/>
+          </p:nvSpPr>
+          <p:spPr>
+            <a:xfrm>
+              <a:off x="2687614" y="2502898"/>
+              <a:ext cx="492443" cy="1267428"/>
+            </a:xfrm>
+            <a:prstGeom prst="rect">
+              <a:avLst/>
+            </a:prstGeom>
+            <a:noFill/>
+          </p:spPr>
+          <p:txBody>
+            <a:bodyPr vert="eaVert" wrap="square" rtlCol="0">
+              <a:spAutoFit/>
+            </a:bodyPr>
+            <a:lstStyle/>
+            <a:p>
+              <a:r>
+                <a:rPr lang="en-US" altLang="zh-CN" sz="2000" dirty="0">
+                  <a:solidFill>
+                    <a:schemeClr val="bg1"/>
+                  </a:solidFill>
+                </a:rPr>
+                <a:t>Queue #1</a:t>
+              </a:r>
+              <a:endParaRPr lang="zh-CN" altLang="en-US" sz="2000" dirty="0">
+                <a:solidFill>
+                  <a:schemeClr val="bg1"/>
+                </a:solidFill>
+              </a:endParaRPr>
+            </a:p>
+          </p:txBody>
+        </p:sp>
+        <p:sp>
+          <p:nvSpPr>
+            <p:cNvPr id="10" name="文本框 9">
+              <a:extLst>
+                <a:ext uri="{FF2B5EF4-FFF2-40B4-BE49-F238E27FC236}">
+                  <a16:creationId xmlns:a16="http://schemas.microsoft.com/office/drawing/2014/main" id="{EF025D9C-D14C-449E-BD01-E4DFCFE0999C}"/>
+                </a:ext>
+              </a:extLst>
+            </p:cNvPr>
+            <p:cNvSpPr txBox="1"/>
+            <p:nvPr/>
+          </p:nvSpPr>
+          <p:spPr>
+            <a:xfrm>
+              <a:off x="3624681" y="2502898"/>
+              <a:ext cx="492443" cy="1267428"/>
+            </a:xfrm>
+            <a:prstGeom prst="rect">
+              <a:avLst/>
+            </a:prstGeom>
+            <a:noFill/>
+          </p:spPr>
+          <p:txBody>
+            <a:bodyPr vert="eaVert" wrap="square" rtlCol="0">
+              <a:spAutoFit/>
+            </a:bodyPr>
+            <a:lstStyle/>
+            <a:p>
+              <a:r>
+                <a:rPr lang="en-US" altLang="zh-CN" sz="2000" dirty="0">
+                  <a:solidFill>
+                    <a:schemeClr val="bg1"/>
+                  </a:solidFill>
+                </a:rPr>
+                <a:t>Queue #2</a:t>
+              </a:r>
+              <a:endParaRPr lang="zh-CN" altLang="en-US" sz="2000" dirty="0">
+                <a:solidFill>
+                  <a:schemeClr val="bg1"/>
+                </a:solidFill>
+              </a:endParaRPr>
+            </a:p>
+          </p:txBody>
+        </p:sp>
+        <p:sp>
+          <p:nvSpPr>
+            <p:cNvPr id="11" name="文本框 10">
+              <a:extLst>
+                <a:ext uri="{FF2B5EF4-FFF2-40B4-BE49-F238E27FC236}">
+                  <a16:creationId xmlns:a16="http://schemas.microsoft.com/office/drawing/2014/main" id="{5EA8BDF1-D8AF-42E2-844E-FA899D635F0A}"/>
+                </a:ext>
+              </a:extLst>
+            </p:cNvPr>
+            <p:cNvSpPr txBox="1"/>
+            <p:nvPr/>
+          </p:nvSpPr>
+          <p:spPr>
+            <a:xfrm>
+              <a:off x="5412800" y="2502898"/>
+              <a:ext cx="492443" cy="1267428"/>
+            </a:xfrm>
+            <a:prstGeom prst="rect">
+              <a:avLst/>
+            </a:prstGeom>
+            <a:noFill/>
+          </p:spPr>
+          <p:txBody>
+            <a:bodyPr vert="eaVert" wrap="square" rtlCol="0">
+              <a:spAutoFit/>
+            </a:bodyPr>
+            <a:lstStyle/>
+            <a:p>
+              <a:r>
+                <a:rPr lang="en-US" altLang="zh-CN" sz="2000" dirty="0">
+                  <a:solidFill>
+                    <a:schemeClr val="bg1"/>
+                  </a:solidFill>
+                </a:rPr>
+                <a:t>Queue #n</a:t>
+              </a:r>
+              <a:endParaRPr lang="zh-CN" altLang="en-US" sz="2000" dirty="0">
+                <a:solidFill>
+                  <a:schemeClr val="bg1"/>
+                </a:solidFill>
+              </a:endParaRPr>
+            </a:p>
+          </p:txBody>
+        </p:sp>
+        <p:sp>
+          <p:nvSpPr>
+            <p:cNvPr id="12" name="文本框 11">
+              <a:extLst>
+                <a:ext uri="{FF2B5EF4-FFF2-40B4-BE49-F238E27FC236}">
+                  <a16:creationId xmlns:a16="http://schemas.microsoft.com/office/drawing/2014/main" id="{A6168EA6-D9F0-44E1-A29C-0CE50635243E}"/>
+                </a:ext>
+              </a:extLst>
+            </p:cNvPr>
+            <p:cNvSpPr txBox="1"/>
+            <p:nvPr/>
+          </p:nvSpPr>
+          <p:spPr>
+            <a:xfrm>
+              <a:off x="3295215" y="382535"/>
+              <a:ext cx="2176040" cy="646331"/>
+            </a:xfrm>
+            <a:prstGeom prst="rect">
+              <a:avLst/>
+            </a:prstGeom>
+            <a:noFill/>
+          </p:spPr>
+          <p:txBody>
+            <a:bodyPr wrap="square" rtlCol="0">
+              <a:spAutoFit/>
+            </a:bodyPr>
+            <a:lstStyle/>
+            <a:p>
+              <a:r>
+                <a:rPr lang="en-US" altLang="zh-CN" dirty="0"/>
+                <a:t>Query</a:t>
+              </a:r>
+              <a:r>
+                <a:rPr lang="zh-CN" altLang="en-US" dirty="0"/>
+                <a:t>分析后的结果进行多队列召回</a:t>
+              </a:r>
+            </a:p>
+          </p:txBody>
+        </p:sp>
+        <p:sp>
+          <p:nvSpPr>
+            <p:cNvPr id="14" name="文本框 13">
+              <a:extLst>
+                <a:ext uri="{FF2B5EF4-FFF2-40B4-BE49-F238E27FC236}">
+                  <a16:creationId xmlns:a16="http://schemas.microsoft.com/office/drawing/2014/main" id="{42848857-778D-4515-A678-71D2025D768F}"/>
+                </a:ext>
+              </a:extLst>
+            </p:cNvPr>
+            <p:cNvSpPr txBox="1"/>
+            <p:nvPr/>
+          </p:nvSpPr>
+          <p:spPr>
+            <a:xfrm>
+              <a:off x="3734252" y="4934748"/>
+              <a:ext cx="1502903" cy="646331"/>
+            </a:xfrm>
+            <a:prstGeom prst="rect">
+              <a:avLst/>
+            </a:prstGeom>
+            <a:noFill/>
+          </p:spPr>
+          <p:txBody>
+            <a:bodyPr wrap="square" rtlCol="0">
+              <a:spAutoFit/>
+            </a:bodyPr>
+            <a:lstStyle/>
+            <a:p>
+              <a:r>
+                <a:rPr lang="zh-CN" altLang="en-US" dirty="0"/>
+                <a:t>多队列分别队列内排序</a:t>
+              </a:r>
+            </a:p>
+          </p:txBody>
+        </p:sp>
+        <p:sp>
+          <p:nvSpPr>
+            <p:cNvPr id="15" name="箭头: 右 14">
+              <a:extLst>
+                <a:ext uri="{FF2B5EF4-FFF2-40B4-BE49-F238E27FC236}">
+                  <a16:creationId xmlns:a16="http://schemas.microsoft.com/office/drawing/2014/main" id="{BE1CF20D-AC17-42F8-B7EA-2EF521E66D64}"/>
+                </a:ext>
+              </a:extLst>
+            </p:cNvPr>
+            <p:cNvSpPr/>
+            <p:nvPr/>
+          </p:nvSpPr>
+          <p:spPr>
+            <a:xfrm rot="5400000">
+              <a:off x="4182953" y="4135944"/>
+              <a:ext cx="400561" cy="1024664"/>
+            </a:xfrm>
+            <a:prstGeom prst="rightArrow">
+              <a:avLst/>
+            </a:prstGeom>
+            <a:gradFill flip="none" rotWithShape="1">
+              <a:gsLst>
+                <a:gs pos="0">
+                  <a:schemeClr val="accent4">
+                    <a:lumMod val="40000"/>
+                    <a:lumOff val="60000"/>
+                  </a:schemeClr>
+                </a:gs>
+                <a:gs pos="46000">
+                  <a:schemeClr val="accent4">
+                    <a:lumMod val="95000"/>
+                    <a:lumOff val="5000"/>
+                  </a:schemeClr>
+                </a:gs>
+                <a:gs pos="84000">
+                  <a:schemeClr val="accent4">
+                    <a:lumMod val="60000"/>
+                  </a:schemeClr>
+                </a:gs>
+              </a:gsLst>
+              <a:lin ang="10800000" scaled="0"/>
+              <a:tileRect/>
+            </a:gradFill>
+            <a:ln>
+              <a:noFill/>
+            </a:ln>
+          </p:spPr>
+          <p:style>
+            <a:lnRef idx="2">
+              <a:schemeClr val="accent1">
+                <a:shade val="50000"/>
+              </a:schemeClr>
+            </a:lnRef>
+            <a:fillRef idx="1">
+              <a:schemeClr val="accent1"/>
+            </a:fillRef>
+            <a:effectRef idx="0">
+              <a:schemeClr val="accent1"/>
+            </a:effectRef>
+            <a:fontRef idx="minor">
+              <a:schemeClr val="lt1"/>
+            </a:fontRef>
+          </p:style>
+          <p:txBody>
+            <a:bodyPr rtlCol="0" anchor="ctr"/>
+            <a:lstStyle/>
+            <a:p>
+              <a:pPr algn="ctr"/>
+              <a:endParaRPr lang="zh-CN" altLang="en-US"/>
+            </a:p>
+          </p:txBody>
+        </p:sp>
+        <p:sp>
+          <p:nvSpPr>
+            <p:cNvPr id="16" name="箭头: 右 15">
+              <a:extLst>
+                <a:ext uri="{FF2B5EF4-FFF2-40B4-BE49-F238E27FC236}">
+                  <a16:creationId xmlns:a16="http://schemas.microsoft.com/office/drawing/2014/main" id="{AA8EADC0-1862-4905-A079-9074C73578DE}"/>
+                </a:ext>
+              </a:extLst>
+            </p:cNvPr>
+            <p:cNvSpPr/>
+            <p:nvPr/>
+          </p:nvSpPr>
+          <p:spPr>
+            <a:xfrm rot="5400000">
+              <a:off x="4164719" y="5355220"/>
+              <a:ext cx="400561" cy="1024664"/>
+            </a:xfrm>
+            <a:prstGeom prst="rightArrow">
+              <a:avLst/>
+            </a:prstGeom>
+            <a:gradFill flip="none" rotWithShape="1">
+              <a:gsLst>
+                <a:gs pos="0">
+                  <a:schemeClr val="accent4">
+                    <a:lumMod val="40000"/>
+                    <a:lumOff val="60000"/>
+                  </a:schemeClr>
+                </a:gs>
+                <a:gs pos="46000">
+                  <a:schemeClr val="accent4">
+                    <a:lumMod val="95000"/>
+                    <a:lumOff val="5000"/>
+                  </a:schemeClr>
+                </a:gs>
+                <a:gs pos="84000">
+                  <a:schemeClr val="accent4">
+                    <a:lumMod val="60000"/>
+                  </a:schemeClr>
+                </a:gs>
+              </a:gsLst>
+              <a:lin ang="10800000" scaled="0"/>
+              <a:tileRect/>
+            </a:gradFill>
+            <a:ln>
+              <a:noFill/>
+            </a:ln>
+          </p:spPr>
+          <p:style>
+            <a:lnRef idx="2">
+              <a:schemeClr val="accent1">
+                <a:shade val="50000"/>
+              </a:schemeClr>
+            </a:lnRef>
+            <a:fillRef idx="1">
+              <a:schemeClr val="accent1"/>
+            </a:fillRef>
+            <a:effectRef idx="0">
+              <a:schemeClr val="accent1"/>
+            </a:effectRef>
+            <a:fontRef idx="minor">
+              <a:schemeClr val="lt1"/>
+            </a:fontRef>
+          </p:style>
+          <p:txBody>
+            <a:bodyPr rtlCol="0" anchor="ctr"/>
+            <a:lstStyle/>
+            <a:p>
+              <a:pPr algn="ctr"/>
+              <a:endParaRPr lang="zh-CN" altLang="en-US"/>
+            </a:p>
+          </p:txBody>
+        </p:sp>
+        <p:sp>
+          <p:nvSpPr>
+            <p:cNvPr id="17" name="文本框 16">
+              <a:extLst>
+                <a:ext uri="{FF2B5EF4-FFF2-40B4-BE49-F238E27FC236}">
+                  <a16:creationId xmlns:a16="http://schemas.microsoft.com/office/drawing/2014/main" id="{F6F590F9-D2A9-4FA7-AF91-EBA089427472}"/>
+                </a:ext>
+              </a:extLst>
+            </p:cNvPr>
+            <p:cNvSpPr txBox="1"/>
+            <p:nvPr/>
+          </p:nvSpPr>
+          <p:spPr>
+            <a:xfrm>
+              <a:off x="3683800" y="6121141"/>
+              <a:ext cx="1737004" cy="923330"/>
+            </a:xfrm>
+            <a:prstGeom prst="rect">
+              <a:avLst/>
+            </a:prstGeom>
+            <a:noFill/>
+          </p:spPr>
+          <p:txBody>
+            <a:bodyPr wrap="square" rtlCol="0">
+              <a:spAutoFit/>
+            </a:bodyPr>
+            <a:lstStyle/>
+            <a:p>
+              <a:r>
+                <a:rPr lang="zh-CN" altLang="en-US" dirty="0"/>
+                <a:t>多队列间组合与</a:t>
+              </a:r>
+              <a:r>
+                <a:rPr lang="en-US" altLang="zh-CN" dirty="0"/>
+                <a:t>PK</a:t>
+              </a:r>
+              <a:r>
+                <a:rPr lang="zh-CN" altLang="en-US" dirty="0"/>
+                <a:t>得到最终排序结果</a:t>
+              </a:r>
+            </a:p>
+          </p:txBody>
+        </p:sp>
+        <p:sp>
+          <p:nvSpPr>
+            <p:cNvPr id="18" name="矩形 17">
+              <a:extLst>
+                <a:ext uri="{FF2B5EF4-FFF2-40B4-BE49-F238E27FC236}">
+                  <a16:creationId xmlns:a16="http://schemas.microsoft.com/office/drawing/2014/main" id="{232B08D4-7013-489C-9C34-BD4ACB75F50C}"/>
+                </a:ext>
+              </a:extLst>
+            </p:cNvPr>
+            <p:cNvSpPr/>
+            <p:nvPr/>
+          </p:nvSpPr>
+          <p:spPr>
+            <a:xfrm>
+              <a:off x="7503469" y="1636888"/>
+              <a:ext cx="530578" cy="2668893"/>
+            </a:xfrm>
+            <a:prstGeom prst="rect">
+              <a:avLst/>
+            </a:prstGeom>
+            <a:solidFill>
+              <a:schemeClr val="accent6">
+                <a:lumMod val="75000"/>
+                <a:alpha val="60000"/>
+              </a:schemeClr>
+            </a:solidFill>
+            <a:ln>
+              <a:noFill/>
+            </a:ln>
+          </p:spPr>
+          <p:style>
+            <a:lnRef idx="2">
+              <a:schemeClr val="accent1">
+                <a:shade val="50000"/>
+              </a:schemeClr>
+            </a:lnRef>
+            <a:fillRef idx="1">
+              <a:schemeClr val="accent1"/>
+            </a:fillRef>
+            <a:effectRef idx="0">
+              <a:schemeClr val="accent1"/>
+            </a:effectRef>
+            <a:fontRef idx="minor">
+              <a:schemeClr val="lt1"/>
+            </a:fontRef>
+          </p:style>
+          <p:txBody>
+            <a:bodyPr rtlCol="0" anchor="ctr"/>
+            <a:lstStyle/>
+            <a:p>
+              <a:pPr algn="ctr"/>
+              <a:endParaRPr lang="zh-CN" altLang="en-US"/>
+            </a:p>
+          </p:txBody>
+        </p:sp>
+        <p:sp>
+          <p:nvSpPr>
+            <p:cNvPr id="19" name="文本框 18">
+              <a:extLst>
+                <a:ext uri="{FF2B5EF4-FFF2-40B4-BE49-F238E27FC236}">
+                  <a16:creationId xmlns:a16="http://schemas.microsoft.com/office/drawing/2014/main" id="{A35EE5D1-3D35-4629-8686-24B6F324328C}"/>
+                </a:ext>
+              </a:extLst>
+            </p:cNvPr>
+            <p:cNvSpPr txBox="1"/>
+            <p:nvPr/>
+          </p:nvSpPr>
+          <p:spPr>
+            <a:xfrm>
+              <a:off x="7511348" y="2152531"/>
+              <a:ext cx="492443" cy="1968161"/>
+            </a:xfrm>
+            <a:prstGeom prst="rect">
+              <a:avLst/>
+            </a:prstGeom>
+            <a:noFill/>
+          </p:spPr>
+          <p:txBody>
+            <a:bodyPr vert="eaVert" wrap="square" rtlCol="0">
+              <a:spAutoFit/>
+            </a:bodyPr>
+            <a:lstStyle/>
+            <a:p>
+              <a:r>
+                <a:rPr lang="en-US" altLang="zh-CN" sz="2000" dirty="0">
+                  <a:solidFill>
+                    <a:schemeClr val="bg1"/>
+                  </a:solidFill>
+                </a:rPr>
+                <a:t>Queue #(n+1)</a:t>
+              </a:r>
+              <a:endParaRPr lang="zh-CN" altLang="en-US" sz="2000" dirty="0">
+                <a:solidFill>
+                  <a:schemeClr val="bg1"/>
+                </a:solidFill>
+              </a:endParaRPr>
+            </a:p>
+          </p:txBody>
+        </p:sp>
+        <p:cxnSp>
+          <p:nvCxnSpPr>
+            <p:cNvPr id="22" name="直接箭头连接符 21">
+              <a:extLst>
+                <a:ext uri="{FF2B5EF4-FFF2-40B4-BE49-F238E27FC236}">
+                  <a16:creationId xmlns:a16="http://schemas.microsoft.com/office/drawing/2014/main" id="{B1B1877D-B4C1-4C75-88A9-3C4A9DC61C19}"/>
+                </a:ext>
+              </a:extLst>
+            </p:cNvPr>
+            <p:cNvCxnSpPr/>
+            <p:nvPr/>
+          </p:nvCxnSpPr>
+          <p:spPr>
+            <a:xfrm flipH="1">
+              <a:off x="6331352" y="2997844"/>
+              <a:ext cx="787078" cy="0"/>
+            </a:xfrm>
+            <a:prstGeom prst="straightConnector1">
+              <a:avLst/>
+            </a:prstGeom>
+            <a:ln w="38100">
+              <a:solidFill>
+                <a:schemeClr val="accent1"/>
+              </a:solidFill>
+              <a:tailEnd type="triangle"/>
+            </a:ln>
+          </p:spPr>
+          <p:style>
+            <a:lnRef idx="1">
+              <a:schemeClr val="accent1"/>
+            </a:lnRef>
+            <a:fillRef idx="0">
+              <a:schemeClr val="accent1"/>
+            </a:fillRef>
+            <a:effectRef idx="0">
+              <a:schemeClr val="accent1"/>
+            </a:effectRef>
+            <a:fontRef idx="minor">
+              <a:schemeClr val="tx1"/>
+            </a:fontRef>
+          </p:style>
+        </p:cxnSp>
+        <p:sp>
+          <p:nvSpPr>
+            <p:cNvPr id="23" name="文本框 22">
+              <a:extLst>
+                <a:ext uri="{FF2B5EF4-FFF2-40B4-BE49-F238E27FC236}">
+                  <a16:creationId xmlns:a16="http://schemas.microsoft.com/office/drawing/2014/main" id="{2C6BB09E-B3DC-4CC4-AD6E-8F05C15233CA}"/>
+                </a:ext>
+              </a:extLst>
+            </p:cNvPr>
+            <p:cNvSpPr txBox="1"/>
+            <p:nvPr/>
+          </p:nvSpPr>
+          <p:spPr>
+            <a:xfrm>
+              <a:off x="6084425" y="1943932"/>
+              <a:ext cx="1502903" cy="923330"/>
+            </a:xfrm>
+            <a:prstGeom prst="rect">
+              <a:avLst/>
+            </a:prstGeom>
+            <a:noFill/>
+          </p:spPr>
+          <p:txBody>
+            <a:bodyPr wrap="square" rtlCol="0">
+              <a:spAutoFit/>
+            </a:bodyPr>
+            <a:lstStyle/>
+            <a:p>
+              <a:r>
+                <a:rPr lang="zh-CN" altLang="en-US" dirty="0"/>
+                <a:t>根据需求可以添加新的队列</a:t>
+              </a:r>
+            </a:p>
+          </p:txBody>
+        </p:sp>
+      </p:grpSp>
     </p:spTree>
     <p:extLst>
       <p:ext uri="{BB962C8B-B14F-4D97-AF65-F5344CB8AC3E}">

</xml_diff>